<commit_message>
added population importance column and multiplied ais effect by it
</commit_message>
<xml_diff>
--- a/notes/SARA Prioritization Model_2025_03_20.pptx
+++ b/notes/SARA Prioritization Model_2025_03_20.pptx
@@ -7,6 +7,7 @@
   <p:sldIdLst>
     <p:sldId id="256" r:id="rId2"/>
     <p:sldId id="257" r:id="rId3"/>
+    <p:sldId id="258" r:id="rId4"/>
   </p:sldIdLst>
   <p:sldSz cx="12192000" cy="6858000"/>
   <p:notesSz cx="6858000" cy="9144000"/>
@@ -105,6 +106,22 @@
       </a:defRPr>
     </a:lvl9pPr>
   </p:defaultTextStyle>
+  <p:extLst>
+    <p:ext uri="{521415D9-36F7-43E2-AB2F-B90AF26B5E84}">
+      <p14:sectionLst xmlns:p14="http://schemas.microsoft.com/office/powerpoint/2010/main">
+        <p14:section name="Default Section" id="{C70A4FAC-89BB-4BC1-BA81-F68015437426}">
+          <p14:sldIdLst>
+            <p14:sldId id="256"/>
+            <p14:sldId id="257"/>
+            <p14:sldId id="258"/>
+          </p14:sldIdLst>
+        </p14:section>
+      </p14:sectionLst>
+    </p:ext>
+    <p:ext uri="{EFAFB233-063F-42B5-8137-9DF3F51BA10A}">
+      <p15:sldGuideLst xmlns:p15="http://schemas.microsoft.com/office/powerpoint/2012/main"/>
+    </p:ext>
+  </p:extLst>
 </p:presentation>
 </file>
 
@@ -255,7 +272,7 @@
           <a:p>
             <a:fld id="{5A227BB9-C24B-4729-A4FE-AEDDDAE5B331}" type="datetimeFigureOut">
               <a:rPr lang="en-US" smtClean="0"/>
-              <a:t>3/20/2025</a:t>
+              <a:t>3/24/2025</a:t>
             </a:fld>
             <a:endParaRPr lang="en-US"/>
           </a:p>
@@ -453,7 +470,7 @@
           <a:p>
             <a:fld id="{5A227BB9-C24B-4729-A4FE-AEDDDAE5B331}" type="datetimeFigureOut">
               <a:rPr lang="en-US" smtClean="0"/>
-              <a:t>3/20/2025</a:t>
+              <a:t>3/24/2025</a:t>
             </a:fld>
             <a:endParaRPr lang="en-US"/>
           </a:p>
@@ -661,7 +678,7 @@
           <a:p>
             <a:fld id="{5A227BB9-C24B-4729-A4FE-AEDDDAE5B331}" type="datetimeFigureOut">
               <a:rPr lang="en-US" smtClean="0"/>
-              <a:t>3/20/2025</a:t>
+              <a:t>3/24/2025</a:t>
             </a:fld>
             <a:endParaRPr lang="en-US"/>
           </a:p>
@@ -859,7 +876,7 @@
           <a:p>
             <a:fld id="{5A227BB9-C24B-4729-A4FE-AEDDDAE5B331}" type="datetimeFigureOut">
               <a:rPr lang="en-US" smtClean="0"/>
-              <a:t>3/20/2025</a:t>
+              <a:t>3/24/2025</a:t>
             </a:fld>
             <a:endParaRPr lang="en-US"/>
           </a:p>
@@ -1134,7 +1151,7 @@
           <a:p>
             <a:fld id="{5A227BB9-C24B-4729-A4FE-AEDDDAE5B331}" type="datetimeFigureOut">
               <a:rPr lang="en-US" smtClean="0"/>
-              <a:t>3/20/2025</a:t>
+              <a:t>3/24/2025</a:t>
             </a:fld>
             <a:endParaRPr lang="en-US"/>
           </a:p>
@@ -1399,7 +1416,7 @@
           <a:p>
             <a:fld id="{5A227BB9-C24B-4729-A4FE-AEDDDAE5B331}" type="datetimeFigureOut">
               <a:rPr lang="en-US" smtClean="0"/>
-              <a:t>3/20/2025</a:t>
+              <a:t>3/24/2025</a:t>
             </a:fld>
             <a:endParaRPr lang="en-US"/>
           </a:p>
@@ -1811,7 +1828,7 @@
           <a:p>
             <a:fld id="{5A227BB9-C24B-4729-A4FE-AEDDDAE5B331}" type="datetimeFigureOut">
               <a:rPr lang="en-US" smtClean="0"/>
-              <a:t>3/20/2025</a:t>
+              <a:t>3/24/2025</a:t>
             </a:fld>
             <a:endParaRPr lang="en-US"/>
           </a:p>
@@ -1952,7 +1969,7 @@
           <a:p>
             <a:fld id="{5A227BB9-C24B-4729-A4FE-AEDDDAE5B331}" type="datetimeFigureOut">
               <a:rPr lang="en-US" smtClean="0"/>
-              <a:t>3/20/2025</a:t>
+              <a:t>3/24/2025</a:t>
             </a:fld>
             <a:endParaRPr lang="en-US"/>
           </a:p>
@@ -2065,7 +2082,7 @@
           <a:p>
             <a:fld id="{5A227BB9-C24B-4729-A4FE-AEDDDAE5B331}" type="datetimeFigureOut">
               <a:rPr lang="en-US" smtClean="0"/>
-              <a:t>3/20/2025</a:t>
+              <a:t>3/24/2025</a:t>
             </a:fld>
             <a:endParaRPr lang="en-US"/>
           </a:p>
@@ -2376,7 +2393,7 @@
           <a:p>
             <a:fld id="{5A227BB9-C24B-4729-A4FE-AEDDDAE5B331}" type="datetimeFigureOut">
               <a:rPr lang="en-US" smtClean="0"/>
-              <a:t>3/20/2025</a:t>
+              <a:t>3/24/2025</a:t>
             </a:fld>
             <a:endParaRPr lang="en-US"/>
           </a:p>
@@ -2664,7 +2681,7 @@
           <a:p>
             <a:fld id="{5A227BB9-C24B-4729-A4FE-AEDDDAE5B331}" type="datetimeFigureOut">
               <a:rPr lang="en-US" smtClean="0"/>
-              <a:t>3/20/2025</a:t>
+              <a:t>3/24/2025</a:t>
             </a:fld>
             <a:endParaRPr lang="en-US"/>
           </a:p>
@@ -2905,7 +2922,7 @@
           <a:p>
             <a:fld id="{5A227BB9-C24B-4729-A4FE-AEDDDAE5B331}" type="datetimeFigureOut">
               <a:rPr lang="en-US" smtClean="0"/>
-              <a:t>3/20/2025</a:t>
+              <a:t>3/24/2025</a:t>
             </a:fld>
             <a:endParaRPr lang="en-US"/>
           </a:p>
@@ -3837,111 +3854,6 @@
       </p:sp>
       <p:sp>
         <p:nvSpPr>
-          <p:cNvPr id="13" name="TextBox 12">
-            <a:extLst>
-              <a:ext uri="{FF2B5EF4-FFF2-40B4-BE49-F238E27FC236}">
-                <a16:creationId xmlns:a16="http://schemas.microsoft.com/office/drawing/2014/main" id="{5404E63E-1C94-A040-958C-05FF375534DC}"/>
-              </a:ext>
-            </a:extLst>
-          </p:cNvPr>
-          <p:cNvSpPr txBox="1"/>
-          <p:nvPr/>
-        </p:nvSpPr>
-        <p:spPr>
-          <a:xfrm>
-            <a:off x="7466203" y="1342023"/>
-            <a:ext cx="1948482" cy="369332"/>
-          </a:xfrm>
-          <a:prstGeom prst="rect">
-            <a:avLst/>
-          </a:prstGeom>
-          <a:noFill/>
-        </p:spPr>
-        <p:txBody>
-          <a:bodyPr wrap="none" rtlCol="0">
-            <a:spAutoFit/>
-          </a:bodyPr>
-          <a:lstStyle/>
-          <a:p>
-            <a:r>
-              <a:rPr lang="en-US" dirty="0"/>
-              <a:t>Lowest Priority (1)</a:t>
-            </a:r>
-          </a:p>
-        </p:txBody>
-      </p:sp>
-      <p:sp>
-        <p:nvSpPr>
-          <p:cNvPr id="14" name="TextBox 13">
-            <a:extLst>
-              <a:ext uri="{FF2B5EF4-FFF2-40B4-BE49-F238E27FC236}">
-                <a16:creationId xmlns:a16="http://schemas.microsoft.com/office/drawing/2014/main" id="{898A3BBB-23DC-375A-1CC6-AA78AEEF1BA4}"/>
-              </a:ext>
-            </a:extLst>
-          </p:cNvPr>
-          <p:cNvSpPr txBox="1"/>
-          <p:nvPr/>
-        </p:nvSpPr>
-        <p:spPr>
-          <a:xfrm>
-            <a:off x="7466203" y="3280205"/>
-            <a:ext cx="2049920" cy="369332"/>
-          </a:xfrm>
-          <a:prstGeom prst="rect">
-            <a:avLst/>
-          </a:prstGeom>
-          <a:noFill/>
-        </p:spPr>
-        <p:txBody>
-          <a:bodyPr wrap="none" rtlCol="0">
-            <a:spAutoFit/>
-          </a:bodyPr>
-          <a:lstStyle/>
-          <a:p>
-            <a:r>
-              <a:rPr lang="en-US" dirty="0"/>
-              <a:t>Medium Priority (2)</a:t>
-            </a:r>
-          </a:p>
-        </p:txBody>
-      </p:sp>
-      <p:sp>
-        <p:nvSpPr>
-          <p:cNvPr id="15" name="TextBox 14">
-            <a:extLst>
-              <a:ext uri="{FF2B5EF4-FFF2-40B4-BE49-F238E27FC236}">
-                <a16:creationId xmlns:a16="http://schemas.microsoft.com/office/drawing/2014/main" id="{1CF43D11-AE49-AEE2-55F8-93EA7E6328DD}"/>
-              </a:ext>
-            </a:extLst>
-          </p:cNvPr>
-          <p:cNvSpPr txBox="1"/>
-          <p:nvPr/>
-        </p:nvSpPr>
-        <p:spPr>
-          <a:xfrm>
-            <a:off x="7415484" y="5203972"/>
-            <a:ext cx="1692451" cy="369332"/>
-          </a:xfrm>
-          <a:prstGeom prst="rect">
-            <a:avLst/>
-          </a:prstGeom>
-          <a:noFill/>
-        </p:spPr>
-        <p:txBody>
-          <a:bodyPr wrap="none" rtlCol="0">
-            <a:spAutoFit/>
-          </a:bodyPr>
-          <a:lstStyle/>
-          <a:p>
-            <a:r>
-              <a:rPr lang="en-US" dirty="0"/>
-              <a:t>High Priority (3)</a:t>
-            </a:r>
-          </a:p>
-        </p:txBody>
-      </p:sp>
-      <p:sp>
-        <p:nvSpPr>
           <p:cNvPr id="16" name="TextBox 15">
             <a:extLst>
               <a:ext uri="{FF2B5EF4-FFF2-40B4-BE49-F238E27FC236}">
@@ -3979,6 +3891,293 @@
     <p:extLst>
       <p:ext uri="{BB962C8B-B14F-4D97-AF65-F5344CB8AC3E}">
         <p14:creationId xmlns:p14="http://schemas.microsoft.com/office/powerpoint/2010/main" val="770565258"/>
+      </p:ext>
+    </p:extLst>
+  </p:cSld>
+  <p:clrMapOvr>
+    <a:masterClrMapping/>
+  </p:clrMapOvr>
+</p:sld>
+</file>
+
+<file path=ppt/slides/slide3.xml><?xml version="1.0" encoding="utf-8"?>
+<p:sld xmlns:a="http://schemas.openxmlformats.org/drawingml/2006/main" xmlns:r="http://schemas.openxmlformats.org/officeDocument/2006/relationships" xmlns:p="http://schemas.openxmlformats.org/presentationml/2006/main">
+  <p:cSld>
+    <p:spTree>
+      <p:nvGrpSpPr>
+        <p:cNvPr id="1" name=""/>
+        <p:cNvGrpSpPr/>
+        <p:nvPr/>
+      </p:nvGrpSpPr>
+      <p:grpSpPr>
+        <a:xfrm>
+          <a:off x="0" y="0"/>
+          <a:ext cx="0" cy="0"/>
+          <a:chOff x="0" y="0"/>
+          <a:chExt cx="0" cy="0"/>
+        </a:xfrm>
+      </p:grpSpPr>
+      <p:sp>
+        <p:nvSpPr>
+          <p:cNvPr id="2" name="Title 1">
+            <a:extLst>
+              <a:ext uri="{FF2B5EF4-FFF2-40B4-BE49-F238E27FC236}">
+                <a16:creationId xmlns:a16="http://schemas.microsoft.com/office/drawing/2014/main" id="{E8FBA98C-846F-67D2-8790-9FE6B06227CC}"/>
+              </a:ext>
+            </a:extLst>
+          </p:cNvPr>
+          <p:cNvSpPr>
+            <a:spLocks noGrp="1"/>
+          </p:cNvSpPr>
+          <p:nvPr>
+            <p:ph type="title"/>
+          </p:nvPr>
+        </p:nvSpPr>
+        <p:spPr/>
+        <p:txBody>
+          <a:bodyPr/>
+          <a:lstStyle/>
+          <a:p>
+            <a:r>
+              <a:rPr lang="en-CA" dirty="0"/>
+              <a:t>AIS Risk Sum</a:t>
+            </a:r>
+            <a:endParaRPr lang="en-US" dirty="0"/>
+          </a:p>
+        </p:txBody>
+      </p:sp>
+      <p:sp>
+        <p:nvSpPr>
+          <p:cNvPr id="3" name="Content Placeholder 2">
+            <a:extLst>
+              <a:ext uri="{FF2B5EF4-FFF2-40B4-BE49-F238E27FC236}">
+                <a16:creationId xmlns:a16="http://schemas.microsoft.com/office/drawing/2014/main" id="{6A874FD7-CD51-465C-2C1B-69CEDDC066CE}"/>
+              </a:ext>
+            </a:extLst>
+          </p:cNvPr>
+          <p:cNvSpPr>
+            <a:spLocks noGrp="1"/>
+          </p:cNvSpPr>
+          <p:nvPr>
+            <p:ph idx="1"/>
+          </p:nvPr>
+        </p:nvSpPr>
+        <p:spPr/>
+        <p:txBody>
+          <a:bodyPr/>
+          <a:lstStyle/>
+          <a:p>
+            <a:r>
+              <a:rPr lang="en-CA" dirty="0"/>
+              <a:t>AIS in waterbody risk (average or max of negative effects on all SAR in </a:t>
+            </a:r>
+            <a:r>
+              <a:rPr lang="en-CA" dirty="0" err="1"/>
+              <a:t>wb</a:t>
+            </a:r>
+            <a:r>
+              <a:rPr lang="en-CA" dirty="0"/>
+              <a:t> on all SARA in </a:t>
+            </a:r>
+            <a:r>
+              <a:rPr lang="en-CA" dirty="0" err="1"/>
+              <a:t>wb</a:t>
+            </a:r>
+            <a:r>
+              <a:rPr lang="en-CA" dirty="0"/>
+              <a:t>)</a:t>
+            </a:r>
+          </a:p>
+          <a:p>
+            <a:endParaRPr lang="en-US" dirty="0"/>
+          </a:p>
+          <a:p>
+            <a:r>
+              <a:rPr lang="en-CA" dirty="0"/>
+              <a:t>AIS upstream risk (average or max of negative effects on all SAR in </a:t>
+            </a:r>
+            <a:r>
+              <a:rPr lang="en-CA" dirty="0" err="1"/>
+              <a:t>wb</a:t>
+            </a:r>
+            <a:r>
+              <a:rPr lang="en-CA" dirty="0"/>
+              <a:t> on all SARA in </a:t>
+            </a:r>
+            <a:r>
+              <a:rPr lang="en-CA" dirty="0" err="1"/>
+              <a:t>wb</a:t>
+            </a:r>
+            <a:r>
+              <a:rPr lang="en-CA" dirty="0"/>
+              <a:t>)</a:t>
+            </a:r>
+          </a:p>
+          <a:p>
+            <a:endParaRPr lang="en-CA" dirty="0"/>
+          </a:p>
+          <a:p>
+            <a:r>
+              <a:rPr lang="en-CA" dirty="0"/>
+              <a:t>Uncertainty is present in separate columns, but also contributes currently to summed risk in waterbody and summed risk upstream like this:</a:t>
+            </a:r>
+          </a:p>
+          <a:p>
+            <a:pPr marL="0" indent="0">
+              <a:buNone/>
+            </a:pPr>
+            <a:endParaRPr lang="en-US" dirty="0"/>
+          </a:p>
+        </p:txBody>
+      </p:sp>
+      <p:sp>
+        <p:nvSpPr>
+          <p:cNvPr id="4" name="TextBox 3">
+            <a:extLst>
+              <a:ext uri="{FF2B5EF4-FFF2-40B4-BE49-F238E27FC236}">
+                <a16:creationId xmlns:a16="http://schemas.microsoft.com/office/drawing/2014/main" id="{8A62D23B-AC1C-E423-0D80-08B3BF11806E}"/>
+              </a:ext>
+            </a:extLst>
+          </p:cNvPr>
+          <p:cNvSpPr txBox="1"/>
+          <p:nvPr/>
+        </p:nvSpPr>
+        <p:spPr>
+          <a:xfrm>
+            <a:off x="6165910" y="5796793"/>
+            <a:ext cx="2172390" cy="369332"/>
+          </a:xfrm>
+          <a:prstGeom prst="rect">
+            <a:avLst/>
+          </a:prstGeom>
+          <a:noFill/>
+        </p:spPr>
+        <p:txBody>
+          <a:bodyPr wrap="none" rtlCol="0">
+            <a:spAutoFit/>
+          </a:bodyPr>
+          <a:lstStyle/>
+          <a:p>
+            <a:r>
+              <a:rPr lang="en-CA" dirty="0"/>
+              <a:t>Summed Risk in WB</a:t>
+            </a:r>
+            <a:endParaRPr lang="en-US" dirty="0"/>
+          </a:p>
+        </p:txBody>
+      </p:sp>
+      <p:sp>
+        <p:nvSpPr>
+          <p:cNvPr id="5" name="TextBox 4">
+            <a:extLst>
+              <a:ext uri="{FF2B5EF4-FFF2-40B4-BE49-F238E27FC236}">
+                <a16:creationId xmlns:a16="http://schemas.microsoft.com/office/drawing/2014/main" id="{75F66559-B51C-340A-3468-EE3FD3F716E5}"/>
+              </a:ext>
+            </a:extLst>
+          </p:cNvPr>
+          <p:cNvSpPr txBox="1"/>
+          <p:nvPr/>
+        </p:nvSpPr>
+        <p:spPr>
+          <a:xfrm>
+            <a:off x="5931018" y="6308209"/>
+            <a:ext cx="2916889" cy="369332"/>
+          </a:xfrm>
+          <a:prstGeom prst="rect">
+            <a:avLst/>
+          </a:prstGeom>
+          <a:noFill/>
+        </p:spPr>
+        <p:txBody>
+          <a:bodyPr wrap="none" rtlCol="0">
+            <a:spAutoFit/>
+          </a:bodyPr>
+          <a:lstStyle/>
+          <a:p>
+            <a:r>
+              <a:rPr lang="en-CA" dirty="0"/>
+              <a:t>Summed Uncertainty in WB</a:t>
+            </a:r>
+            <a:endParaRPr lang="en-US" dirty="0"/>
+          </a:p>
+        </p:txBody>
+      </p:sp>
+      <p:cxnSp>
+        <p:nvCxnSpPr>
+          <p:cNvPr id="7" name="Straight Connector 6">
+            <a:extLst>
+              <a:ext uri="{FF2B5EF4-FFF2-40B4-BE49-F238E27FC236}">
+                <a16:creationId xmlns:a16="http://schemas.microsoft.com/office/drawing/2014/main" id="{C3D16902-42D9-44B3-2A74-239481AF6C05}"/>
+              </a:ext>
+            </a:extLst>
+          </p:cNvPr>
+          <p:cNvCxnSpPr/>
+          <p:nvPr/>
+        </p:nvCxnSpPr>
+        <p:spPr>
+          <a:xfrm>
+            <a:off x="5645793" y="6166125"/>
+            <a:ext cx="3489820" cy="10838"/>
+          </a:xfrm>
+          <a:prstGeom prst="line">
+            <a:avLst/>
+          </a:prstGeom>
+        </p:spPr>
+        <p:style>
+          <a:lnRef idx="2">
+            <a:schemeClr val="accent1"/>
+          </a:lnRef>
+          <a:fillRef idx="0">
+            <a:schemeClr val="accent1"/>
+          </a:fillRef>
+          <a:effectRef idx="1">
+            <a:schemeClr val="accent1"/>
+          </a:effectRef>
+          <a:fontRef idx="minor">
+            <a:schemeClr val="tx1"/>
+          </a:fontRef>
+        </p:style>
+      </p:cxnSp>
+      <p:sp>
+        <p:nvSpPr>
+          <p:cNvPr id="8" name="TextBox 7">
+            <a:extLst>
+              <a:ext uri="{FF2B5EF4-FFF2-40B4-BE49-F238E27FC236}">
+                <a16:creationId xmlns:a16="http://schemas.microsoft.com/office/drawing/2014/main" id="{0AB27021-250B-B4F2-160D-988383BB50FE}"/>
+              </a:ext>
+            </a:extLst>
+          </p:cNvPr>
+          <p:cNvSpPr txBox="1"/>
+          <p:nvPr/>
+        </p:nvSpPr>
+        <p:spPr>
+          <a:xfrm>
+            <a:off x="3774734" y="5981459"/>
+            <a:ext cx="1896225" cy="369332"/>
+          </a:xfrm>
+          <a:prstGeom prst="rect">
+            <a:avLst/>
+          </a:prstGeom>
+          <a:noFill/>
+        </p:spPr>
+        <p:txBody>
+          <a:bodyPr wrap="none" rtlCol="0">
+            <a:spAutoFit/>
+          </a:bodyPr>
+          <a:lstStyle/>
+          <a:p>
+            <a:r>
+              <a:rPr lang="en-CA" dirty="0"/>
+              <a:t>Risk total in WB =</a:t>
+            </a:r>
+            <a:endParaRPr lang="en-US" dirty="0"/>
+          </a:p>
+        </p:txBody>
+      </p:sp>
+    </p:spTree>
+    <p:extLst>
+      <p:ext uri="{BB962C8B-B14F-4D97-AF65-F5344CB8AC3E}">
+        <p14:creationId xmlns:p14="http://schemas.microsoft.com/office/powerpoint/2010/main" val="212489053"/>
       </p:ext>
     </p:extLst>
   </p:cSld>

</xml_diff>